<commit_message>
small refactor adding constants where needed
</commit_message>
<xml_diff>
--- a/tot/prezentare.pptx
+++ b/tot/prezentare.pptx
@@ -279,7 +279,7 @@
           <a:p>
             <a:fld id="{F17F314F-5678-44F2-BA3D-26907F4FB6E2}" type="datetimeFigureOut">
               <a:rPr lang="en-US" smtClean="0"/>
-              <a:t>6/23/2021</a:t>
+              <a:t>6/30/2021</a:t>
             </a:fld>
             <a:endParaRPr lang="en-US"/>
           </a:p>
@@ -477,7 +477,7 @@
           <a:p>
             <a:fld id="{F17F314F-5678-44F2-BA3D-26907F4FB6E2}" type="datetimeFigureOut">
               <a:rPr lang="en-US" smtClean="0"/>
-              <a:t>6/23/2021</a:t>
+              <a:t>6/30/2021</a:t>
             </a:fld>
             <a:endParaRPr lang="en-US"/>
           </a:p>
@@ -685,7 +685,7 @@
           <a:p>
             <a:fld id="{F17F314F-5678-44F2-BA3D-26907F4FB6E2}" type="datetimeFigureOut">
               <a:rPr lang="en-US" smtClean="0"/>
-              <a:t>6/23/2021</a:t>
+              <a:t>6/30/2021</a:t>
             </a:fld>
             <a:endParaRPr lang="en-US"/>
           </a:p>
@@ -883,7 +883,7 @@
           <a:p>
             <a:fld id="{F17F314F-5678-44F2-BA3D-26907F4FB6E2}" type="datetimeFigureOut">
               <a:rPr lang="en-US" smtClean="0"/>
-              <a:t>6/23/2021</a:t>
+              <a:t>6/30/2021</a:t>
             </a:fld>
             <a:endParaRPr lang="en-US"/>
           </a:p>
@@ -1158,7 +1158,7 @@
           <a:p>
             <a:fld id="{F17F314F-5678-44F2-BA3D-26907F4FB6E2}" type="datetimeFigureOut">
               <a:rPr lang="en-US" smtClean="0"/>
-              <a:t>6/23/2021</a:t>
+              <a:t>6/30/2021</a:t>
             </a:fld>
             <a:endParaRPr lang="en-US"/>
           </a:p>
@@ -1423,7 +1423,7 @@
           <a:p>
             <a:fld id="{F17F314F-5678-44F2-BA3D-26907F4FB6E2}" type="datetimeFigureOut">
               <a:rPr lang="en-US" smtClean="0"/>
-              <a:t>6/23/2021</a:t>
+              <a:t>6/30/2021</a:t>
             </a:fld>
             <a:endParaRPr lang="en-US"/>
           </a:p>
@@ -1835,7 +1835,7 @@
           <a:p>
             <a:fld id="{F17F314F-5678-44F2-BA3D-26907F4FB6E2}" type="datetimeFigureOut">
               <a:rPr lang="en-US" smtClean="0"/>
-              <a:t>6/23/2021</a:t>
+              <a:t>6/30/2021</a:t>
             </a:fld>
             <a:endParaRPr lang="en-US"/>
           </a:p>
@@ -1976,7 +1976,7 @@
           <a:p>
             <a:fld id="{F17F314F-5678-44F2-BA3D-26907F4FB6E2}" type="datetimeFigureOut">
               <a:rPr lang="en-US" smtClean="0"/>
-              <a:t>6/23/2021</a:t>
+              <a:t>6/30/2021</a:t>
             </a:fld>
             <a:endParaRPr lang="en-US"/>
           </a:p>
@@ -2089,7 +2089,7 @@
           <a:p>
             <a:fld id="{F17F314F-5678-44F2-BA3D-26907F4FB6E2}" type="datetimeFigureOut">
               <a:rPr lang="en-US" smtClean="0"/>
-              <a:t>6/23/2021</a:t>
+              <a:t>6/30/2021</a:t>
             </a:fld>
             <a:endParaRPr lang="en-US"/>
           </a:p>
@@ -2400,7 +2400,7 @@
           <a:p>
             <a:fld id="{F17F314F-5678-44F2-BA3D-26907F4FB6E2}" type="datetimeFigureOut">
               <a:rPr lang="en-US" smtClean="0"/>
-              <a:t>6/23/2021</a:t>
+              <a:t>6/30/2021</a:t>
             </a:fld>
             <a:endParaRPr lang="en-US"/>
           </a:p>
@@ -2688,7 +2688,7 @@
           <a:p>
             <a:fld id="{F17F314F-5678-44F2-BA3D-26907F4FB6E2}" type="datetimeFigureOut">
               <a:rPr lang="en-US" smtClean="0"/>
-              <a:t>6/23/2021</a:t>
+              <a:t>6/30/2021</a:t>
             </a:fld>
             <a:endParaRPr lang="en-US"/>
           </a:p>
@@ -2929,7 +2929,7 @@
           <a:p>
             <a:fld id="{F17F314F-5678-44F2-BA3D-26907F4FB6E2}" type="datetimeFigureOut">
               <a:rPr lang="en-US" smtClean="0"/>
-              <a:t>6/23/2021</a:t>
+              <a:t>6/30/2021</a:t>
             </a:fld>
             <a:endParaRPr lang="en-US"/>
           </a:p>

</xml_diff>